<commit_message>
added both presentations; changed abstract a little
</commit_message>
<xml_diff>
--- a/documentation/predavanje.pptx
+++ b/documentation/predavanje.pptx
@@ -4,6 +4,15 @@
   <p:sldMasterIdLst>
     <p:sldMasterId id="2147483648" r:id="rId1"/>
   </p:sldMasterIdLst>
+  <p:sldIdLst>
+    <p:sldId id="256" r:id="rId2"/>
+    <p:sldId id="257" r:id="rId3"/>
+    <p:sldId id="260" r:id="rId4"/>
+    <p:sldId id="261" r:id="rId5"/>
+    <p:sldId id="262" r:id="rId6"/>
+    <p:sldId id="258" r:id="rId7"/>
+    <p:sldId id="259" r:id="rId8"/>
+  </p:sldIdLst>
   <p:sldSz cx="9144000" cy="6858000" type="screen4x3"/>
   <p:notesSz cx="6858000" cy="9144000"/>
   <p:defaultTextStyle>
@@ -286,7 +295,7 @@
             <a:fld id="{1D8BD707-D9CF-40AE-B4C6-C98DA3205C09}" type="datetimeFigureOut">
               <a:rPr lang="en-US" smtClean="0"/>
               <a:pPr/>
-              <a:t>9/18/2006</a:t>
+              <a:t>5/24/2012</a:t>
             </a:fld>
             <a:endParaRPr lang="en-US"/>
           </a:p>
@@ -453,7 +462,7 @@
             <a:fld id="{1D8BD707-D9CF-40AE-B4C6-C98DA3205C09}" type="datetimeFigureOut">
               <a:rPr lang="en-US" smtClean="0"/>
               <a:pPr/>
-              <a:t>9/18/2006</a:t>
+              <a:t>5/24/2012</a:t>
             </a:fld>
             <a:endParaRPr lang="en-US"/>
           </a:p>
@@ -630,7 +639,7 @@
             <a:fld id="{1D8BD707-D9CF-40AE-B4C6-C98DA3205C09}" type="datetimeFigureOut">
               <a:rPr lang="en-US" smtClean="0"/>
               <a:pPr/>
-              <a:t>9/18/2006</a:t>
+              <a:t>5/24/2012</a:t>
             </a:fld>
             <a:endParaRPr lang="en-US"/>
           </a:p>
@@ -797,7 +806,7 @@
             <a:fld id="{1D8BD707-D9CF-40AE-B4C6-C98DA3205C09}" type="datetimeFigureOut">
               <a:rPr lang="en-US" smtClean="0"/>
               <a:pPr/>
-              <a:t>9/18/2006</a:t>
+              <a:t>5/24/2012</a:t>
             </a:fld>
             <a:endParaRPr lang="en-US"/>
           </a:p>
@@ -1040,7 +1049,7 @@
             <a:fld id="{1D8BD707-D9CF-40AE-B4C6-C98DA3205C09}" type="datetimeFigureOut">
               <a:rPr lang="en-US" smtClean="0"/>
               <a:pPr/>
-              <a:t>9/18/2006</a:t>
+              <a:t>5/24/2012</a:t>
             </a:fld>
             <a:endParaRPr lang="en-US"/>
           </a:p>
@@ -1325,7 +1334,7 @@
             <a:fld id="{1D8BD707-D9CF-40AE-B4C6-C98DA3205C09}" type="datetimeFigureOut">
               <a:rPr lang="en-US" smtClean="0"/>
               <a:pPr/>
-              <a:t>9/18/2006</a:t>
+              <a:t>5/24/2012</a:t>
             </a:fld>
             <a:endParaRPr lang="en-US"/>
           </a:p>
@@ -1744,7 +1753,7 @@
             <a:fld id="{1D8BD707-D9CF-40AE-B4C6-C98DA3205C09}" type="datetimeFigureOut">
               <a:rPr lang="en-US" smtClean="0"/>
               <a:pPr/>
-              <a:t>9/18/2006</a:t>
+              <a:t>5/24/2012</a:t>
             </a:fld>
             <a:endParaRPr lang="en-US"/>
           </a:p>
@@ -1859,7 +1868,7 @@
             <a:fld id="{1D8BD707-D9CF-40AE-B4C6-C98DA3205C09}" type="datetimeFigureOut">
               <a:rPr lang="en-US" smtClean="0"/>
               <a:pPr/>
-              <a:t>9/18/2006</a:t>
+              <a:t>5/24/2012</a:t>
             </a:fld>
             <a:endParaRPr lang="en-US"/>
           </a:p>
@@ -1951,7 +1960,7 @@
             <a:fld id="{1D8BD707-D9CF-40AE-B4C6-C98DA3205C09}" type="datetimeFigureOut">
               <a:rPr lang="en-US" smtClean="0"/>
               <a:pPr/>
-              <a:t>9/18/2006</a:t>
+              <a:t>5/24/2012</a:t>
             </a:fld>
             <a:endParaRPr lang="en-US"/>
           </a:p>
@@ -2225,7 +2234,7 @@
             <a:fld id="{1D8BD707-D9CF-40AE-B4C6-C98DA3205C09}" type="datetimeFigureOut">
               <a:rPr lang="en-US" smtClean="0"/>
               <a:pPr/>
-              <a:t>9/18/2006</a:t>
+              <a:t>5/24/2012</a:t>
             </a:fld>
             <a:endParaRPr lang="en-US"/>
           </a:p>
@@ -2475,7 +2484,7 @@
             <a:fld id="{1D8BD707-D9CF-40AE-B4C6-C98DA3205C09}" type="datetimeFigureOut">
               <a:rPr lang="en-US" smtClean="0"/>
               <a:pPr/>
-              <a:t>9/18/2006</a:t>
+              <a:t>5/24/2012</a:t>
             </a:fld>
             <a:endParaRPr lang="en-US"/>
           </a:p>
@@ -2685,7 +2694,7 @@
             <a:fld id="{1D8BD707-D9CF-40AE-B4C6-C98DA3205C09}" type="datetimeFigureOut">
               <a:rPr lang="en-US" smtClean="0"/>
               <a:pPr/>
-              <a:t>9/18/2006</a:t>
+              <a:t>5/24/2012</a:t>
             </a:fld>
             <a:endParaRPr lang="en-US"/>
           </a:p>
@@ -3037,6 +3046,679 @@
     </p:otherStyle>
   </p:txStyles>
 </p:sldMaster>
+</file>
+
+<file path=ppt/slides/slide1.xml><?xml version="1.0" encoding="utf-8"?>
+<p:sld xmlns:a="http://schemas.openxmlformats.org/drawingml/2006/main" xmlns:r="http://schemas.openxmlformats.org/officeDocument/2006/relationships" xmlns:p="http://schemas.openxmlformats.org/presentationml/2006/main">
+  <p:cSld>
+    <p:spTree>
+      <p:nvGrpSpPr>
+        <p:cNvPr id="1" name=""/>
+        <p:cNvGrpSpPr/>
+        <p:nvPr/>
+      </p:nvGrpSpPr>
+      <p:grpSpPr>
+        <a:xfrm>
+          <a:off x="0" y="0"/>
+          <a:ext cx="0" cy="0"/>
+          <a:chOff x="0" y="0"/>
+          <a:chExt cx="0" cy="0"/>
+        </a:xfrm>
+      </p:grpSpPr>
+      <p:sp>
+        <p:nvSpPr>
+          <p:cNvPr id="2" name="Title 1"/>
+          <p:cNvSpPr>
+            <a:spLocks noGrp="1"/>
+          </p:cNvSpPr>
+          <p:nvPr>
+            <p:ph type="ctrTitle"/>
+          </p:nvPr>
+        </p:nvSpPr>
+        <p:spPr/>
+        <p:txBody>
+          <a:bodyPr/>
+          <a:lstStyle/>
+          <a:p>
+            <a:r>
+              <a:rPr lang="sl-SI" dirty="0" smtClean="0"/>
+              <a:t>Chiptune</a:t>
+            </a:r>
+            <a:endParaRPr lang="sl-SI" dirty="0"/>
+          </a:p>
+        </p:txBody>
+      </p:sp>
+      <p:sp>
+        <p:nvSpPr>
+          <p:cNvPr id="3" name="Subtitle 2"/>
+          <p:cNvSpPr>
+            <a:spLocks noGrp="1"/>
+          </p:cNvSpPr>
+          <p:nvPr>
+            <p:ph type="subTitle" idx="1"/>
+          </p:nvPr>
+        </p:nvSpPr>
+        <p:spPr/>
+        <p:txBody>
+          <a:bodyPr>
+            <a:normAutofit fontScale="70000" lnSpcReduction="20000"/>
+          </a:bodyPr>
+          <a:lstStyle/>
+          <a:p>
+            <a:r>
+              <a:rPr lang="sl-SI" dirty="0" smtClean="0"/>
+              <a:t>Žiga Elsner, Matej Mežik, Primož Bajželj</a:t>
+            </a:r>
+          </a:p>
+          <a:p>
+            <a:endParaRPr lang="sl-SI" dirty="0"/>
+          </a:p>
+          <a:p>
+            <a:r>
+              <a:rPr lang="sl-SI" dirty="0" smtClean="0"/>
+              <a:t>Fakulteta za računalništvo in informatiko</a:t>
+            </a:r>
+          </a:p>
+          <a:p>
+            <a:endParaRPr lang="sl-SI" dirty="0"/>
+          </a:p>
+          <a:p>
+            <a:r>
+              <a:rPr lang="sl-SI" dirty="0" smtClean="0"/>
+              <a:t>24.Maj 2012</a:t>
+            </a:r>
+            <a:endParaRPr lang="sl-SI" dirty="0"/>
+          </a:p>
+        </p:txBody>
+      </p:sp>
+    </p:spTree>
+    <p:extLst>
+      <p:ext uri="{BB962C8B-B14F-4D97-AF65-F5344CB8AC3E}">
+        <p14:creationId xmlns:p14="http://schemas.microsoft.com/office/powerpoint/2010/main" val="3160788348"/>
+      </p:ext>
+    </p:extLst>
+  </p:cSld>
+  <p:clrMapOvr>
+    <a:masterClrMapping/>
+  </p:clrMapOvr>
+</p:sld>
+</file>
+
+<file path=ppt/slides/slide2.xml><?xml version="1.0" encoding="utf-8"?>
+<p:sld xmlns:a="http://schemas.openxmlformats.org/drawingml/2006/main" xmlns:r="http://schemas.openxmlformats.org/officeDocument/2006/relationships" xmlns:p="http://schemas.openxmlformats.org/presentationml/2006/main">
+  <p:cSld>
+    <p:spTree>
+      <p:nvGrpSpPr>
+        <p:cNvPr id="1" name=""/>
+        <p:cNvGrpSpPr/>
+        <p:nvPr/>
+      </p:nvGrpSpPr>
+      <p:grpSpPr>
+        <a:xfrm>
+          <a:off x="0" y="0"/>
+          <a:ext cx="0" cy="0"/>
+          <a:chOff x="0" y="0"/>
+          <a:chExt cx="0" cy="0"/>
+        </a:xfrm>
+      </p:grpSpPr>
+      <p:sp>
+        <p:nvSpPr>
+          <p:cNvPr id="2" name="Title 1"/>
+          <p:cNvSpPr>
+            <a:spLocks noGrp="1"/>
+          </p:cNvSpPr>
+          <p:nvPr>
+            <p:ph type="title"/>
+          </p:nvPr>
+        </p:nvSpPr>
+        <p:spPr/>
+        <p:txBody>
+          <a:bodyPr/>
+          <a:lstStyle/>
+          <a:p>
+            <a:r>
+              <a:rPr lang="sl-SI" dirty="0" smtClean="0"/>
+              <a:t>Chiptune</a:t>
+            </a:r>
+            <a:endParaRPr lang="sl-SI" dirty="0"/>
+          </a:p>
+        </p:txBody>
+      </p:sp>
+      <p:sp>
+        <p:nvSpPr>
+          <p:cNvPr id="3" name="Content Placeholder 2"/>
+          <p:cNvSpPr>
+            <a:spLocks noGrp="1"/>
+          </p:cNvSpPr>
+          <p:nvPr>
+            <p:ph idx="1"/>
+          </p:nvPr>
+        </p:nvSpPr>
+        <p:spPr/>
+        <p:txBody>
+          <a:bodyPr/>
+          <a:lstStyle/>
+          <a:p>
+            <a:endParaRPr lang="sl-SI"/>
+          </a:p>
+        </p:txBody>
+      </p:sp>
+    </p:spTree>
+    <p:extLst>
+      <p:ext uri="{BB962C8B-B14F-4D97-AF65-F5344CB8AC3E}">
+        <p14:creationId xmlns:p14="http://schemas.microsoft.com/office/powerpoint/2010/main" val="2533353738"/>
+      </p:ext>
+    </p:extLst>
+  </p:cSld>
+  <p:clrMapOvr>
+    <a:masterClrMapping/>
+  </p:clrMapOvr>
+</p:sld>
+</file>
+
+<file path=ppt/slides/slide3.xml><?xml version="1.0" encoding="utf-8"?>
+<p:sld xmlns:a="http://schemas.openxmlformats.org/drawingml/2006/main" xmlns:r="http://schemas.openxmlformats.org/officeDocument/2006/relationships" xmlns:p="http://schemas.openxmlformats.org/presentationml/2006/main">
+  <p:cSld>
+    <p:spTree>
+      <p:nvGrpSpPr>
+        <p:cNvPr id="1" name=""/>
+        <p:cNvGrpSpPr/>
+        <p:nvPr/>
+      </p:nvGrpSpPr>
+      <p:grpSpPr>
+        <a:xfrm>
+          <a:off x="0" y="0"/>
+          <a:ext cx="0" cy="0"/>
+          <a:chOff x="0" y="0"/>
+          <a:chExt cx="0" cy="0"/>
+        </a:xfrm>
+      </p:grpSpPr>
+      <p:sp>
+        <p:nvSpPr>
+          <p:cNvPr id="2" name="Title 1"/>
+          <p:cNvSpPr>
+            <a:spLocks noGrp="1"/>
+          </p:cNvSpPr>
+          <p:nvPr>
+            <p:ph type="title"/>
+          </p:nvPr>
+        </p:nvSpPr>
+        <p:spPr/>
+        <p:txBody>
+          <a:bodyPr/>
+          <a:lstStyle/>
+          <a:p>
+            <a:r>
+              <a:rPr lang="sl-SI" dirty="0" smtClean="0"/>
+              <a:t>Tokovnik - uvod</a:t>
+            </a:r>
+            <a:endParaRPr lang="sl-SI" dirty="0"/>
+          </a:p>
+        </p:txBody>
+      </p:sp>
+      <p:sp>
+        <p:nvSpPr>
+          <p:cNvPr id="3" name="Content Placeholder 2"/>
+          <p:cNvSpPr>
+            <a:spLocks noGrp="1"/>
+          </p:cNvSpPr>
+          <p:nvPr>
+            <p:ph idx="1"/>
+          </p:nvPr>
+        </p:nvSpPr>
+        <p:spPr/>
+        <p:txBody>
+          <a:bodyPr/>
+          <a:lstStyle/>
+          <a:p>
+            <a:r>
+              <a:rPr lang="sl-SI" dirty="0"/>
+              <a:t>Uporaba vira se začne preden imamo celotni vir</a:t>
+            </a:r>
+          </a:p>
+          <a:p>
+            <a:r>
+              <a:rPr lang="sl-SI" dirty="0"/>
+              <a:t>Radio, televizija, cene delnic</a:t>
+            </a:r>
+          </a:p>
+          <a:p>
+            <a:r>
+              <a:rPr lang="sl-SI" dirty="0"/>
+              <a:t>TCP ali UDP</a:t>
+            </a:r>
+          </a:p>
+          <a:p>
+            <a:r>
+              <a:rPr lang="sl-SI" dirty="0"/>
+              <a:t>Obstoječi: Adobe Flash Player, Windows Media Player, RealPlayer, Quick </a:t>
+            </a:r>
+            <a:r>
+              <a:rPr lang="sl-SI" dirty="0" smtClean="0"/>
+              <a:t>Time</a:t>
+            </a:r>
+            <a:endParaRPr lang="sl-SI" dirty="0"/>
+          </a:p>
+        </p:txBody>
+      </p:sp>
+    </p:spTree>
+    <p:extLst>
+      <p:ext uri="{BB962C8B-B14F-4D97-AF65-F5344CB8AC3E}">
+        <p14:creationId xmlns:p14="http://schemas.microsoft.com/office/powerpoint/2010/main" val="1039552074"/>
+      </p:ext>
+    </p:extLst>
+  </p:cSld>
+  <p:clrMapOvr>
+    <a:masterClrMapping/>
+  </p:clrMapOvr>
+</p:sld>
+</file>
+
+<file path=ppt/slides/slide4.xml><?xml version="1.0" encoding="utf-8"?>
+<p:sld xmlns:a="http://schemas.openxmlformats.org/drawingml/2006/main" xmlns:r="http://schemas.openxmlformats.org/officeDocument/2006/relationships" xmlns:p="http://schemas.openxmlformats.org/presentationml/2006/main">
+  <p:cSld>
+    <p:spTree>
+      <p:nvGrpSpPr>
+        <p:cNvPr id="1" name=""/>
+        <p:cNvGrpSpPr/>
+        <p:nvPr/>
+      </p:nvGrpSpPr>
+      <p:grpSpPr>
+        <a:xfrm>
+          <a:off x="0" y="0"/>
+          <a:ext cx="0" cy="0"/>
+          <a:chOff x="0" y="0"/>
+          <a:chExt cx="0" cy="0"/>
+        </a:xfrm>
+      </p:grpSpPr>
+      <p:sp>
+        <p:nvSpPr>
+          <p:cNvPr id="2" name="Title 1"/>
+          <p:cNvSpPr>
+            <a:spLocks noGrp="1"/>
+          </p:cNvSpPr>
+          <p:nvPr>
+            <p:ph type="title"/>
+          </p:nvPr>
+        </p:nvSpPr>
+        <p:spPr/>
+        <p:txBody>
+          <a:bodyPr/>
+          <a:lstStyle/>
+          <a:p>
+            <a:r>
+              <a:rPr lang="sl-SI" dirty="0" smtClean="0"/>
+              <a:t>Tokovnik - klient</a:t>
+            </a:r>
+            <a:endParaRPr lang="sl-SI" dirty="0"/>
+          </a:p>
+        </p:txBody>
+      </p:sp>
+      <p:sp>
+        <p:nvSpPr>
+          <p:cNvPr id="3" name="Content Placeholder 2"/>
+          <p:cNvSpPr>
+            <a:spLocks noGrp="1"/>
+          </p:cNvSpPr>
+          <p:nvPr>
+            <p:ph idx="1"/>
+          </p:nvPr>
+        </p:nvSpPr>
+        <p:spPr/>
+        <p:txBody>
+          <a:bodyPr/>
+          <a:lstStyle/>
+          <a:p>
+            <a:r>
+              <a:rPr lang="sl-SI" dirty="0"/>
+              <a:t>Zahteva za priključitev strežniku</a:t>
+            </a:r>
+          </a:p>
+          <a:p>
+            <a:r>
+              <a:rPr lang="sl-SI" dirty="0"/>
+              <a:t>Prejemanje paketov</a:t>
+            </a:r>
+          </a:p>
+          <a:p>
+            <a:pPr lvl="1"/>
+            <a:r>
+              <a:rPr lang="sl-SI" dirty="0"/>
+              <a:t>Svoja nit</a:t>
+            </a:r>
+          </a:p>
+          <a:p>
+            <a:pPr lvl="1"/>
+            <a:r>
+              <a:rPr lang="sl-SI" dirty="0"/>
+              <a:t>Potrditev formata</a:t>
+            </a:r>
+          </a:p>
+          <a:p>
+            <a:r>
+              <a:rPr lang="sl-SI" dirty="0"/>
+              <a:t>Obdelava paketov</a:t>
+            </a:r>
+          </a:p>
+          <a:p>
+            <a:pPr lvl="1"/>
+            <a:r>
+              <a:rPr lang="sl-SI" dirty="0"/>
+              <a:t>Izbiranje naslednjega „najmlajšega“ paketa</a:t>
+            </a:r>
+          </a:p>
+          <a:p>
+            <a:pPr lvl="1"/>
+            <a:r>
+              <a:rPr lang="sl-SI" dirty="0"/>
+              <a:t>Sporočanje zasičenosti</a:t>
+            </a:r>
+          </a:p>
+          <a:p>
+            <a:endParaRPr lang="sl-SI" dirty="0"/>
+          </a:p>
+        </p:txBody>
+      </p:sp>
+    </p:spTree>
+    <p:extLst>
+      <p:ext uri="{BB962C8B-B14F-4D97-AF65-F5344CB8AC3E}">
+        <p14:creationId xmlns:p14="http://schemas.microsoft.com/office/powerpoint/2010/main" val="3725552857"/>
+      </p:ext>
+    </p:extLst>
+  </p:cSld>
+  <p:clrMapOvr>
+    <a:masterClrMapping/>
+  </p:clrMapOvr>
+</p:sld>
+</file>
+
+<file path=ppt/slides/slide5.xml><?xml version="1.0" encoding="utf-8"?>
+<p:sld xmlns:a="http://schemas.openxmlformats.org/drawingml/2006/main" xmlns:r="http://schemas.openxmlformats.org/officeDocument/2006/relationships" xmlns:p="http://schemas.openxmlformats.org/presentationml/2006/main">
+  <p:cSld>
+    <p:spTree>
+      <p:nvGrpSpPr>
+        <p:cNvPr id="1" name=""/>
+        <p:cNvGrpSpPr/>
+        <p:nvPr/>
+      </p:nvGrpSpPr>
+      <p:grpSpPr>
+        <a:xfrm>
+          <a:off x="0" y="0"/>
+          <a:ext cx="0" cy="0"/>
+          <a:chOff x="0" y="0"/>
+          <a:chExt cx="0" cy="0"/>
+        </a:xfrm>
+      </p:grpSpPr>
+      <p:sp>
+        <p:nvSpPr>
+          <p:cNvPr id="2" name="Title 1"/>
+          <p:cNvSpPr>
+            <a:spLocks noGrp="1"/>
+          </p:cNvSpPr>
+          <p:nvPr>
+            <p:ph type="title"/>
+          </p:nvPr>
+        </p:nvSpPr>
+        <p:spPr/>
+        <p:txBody>
+          <a:bodyPr/>
+          <a:lstStyle/>
+          <a:p>
+            <a:r>
+              <a:rPr lang="sl-SI" dirty="0" smtClean="0"/>
+              <a:t>Tokovnik - Strežnik</a:t>
+            </a:r>
+            <a:endParaRPr lang="sl-SI" dirty="0"/>
+          </a:p>
+        </p:txBody>
+      </p:sp>
+      <p:sp>
+        <p:nvSpPr>
+          <p:cNvPr id="3" name="Content Placeholder 2"/>
+          <p:cNvSpPr>
+            <a:spLocks noGrp="1"/>
+          </p:cNvSpPr>
+          <p:nvPr>
+            <p:ph idx="1"/>
+          </p:nvPr>
+        </p:nvSpPr>
+        <p:spPr/>
+        <p:txBody>
+          <a:bodyPr>
+            <a:normAutofit fontScale="92500" lnSpcReduction="20000"/>
+          </a:bodyPr>
+          <a:lstStyle/>
+          <a:p>
+            <a:r>
+              <a:rPr lang="sl-SI" dirty="0"/>
+              <a:t>Dodajanje novih paketov</a:t>
+            </a:r>
+          </a:p>
+          <a:p>
+            <a:pPr lvl="1"/>
+            <a:r>
+              <a:rPr lang="sl-SI" dirty="0"/>
+              <a:t>V povezavi s Playlist razredom</a:t>
+            </a:r>
+          </a:p>
+          <a:p>
+            <a:pPr lvl="1"/>
+            <a:r>
+              <a:rPr lang="sl-SI" dirty="0"/>
+              <a:t>S pomočjo AudioInputStream</a:t>
+            </a:r>
+          </a:p>
+          <a:p>
+            <a:r>
+              <a:rPr lang="sl-SI" dirty="0"/>
+              <a:t>Prejemanje s strani klientov</a:t>
+            </a:r>
+          </a:p>
+          <a:p>
+            <a:pPr lvl="1"/>
+            <a:r>
+              <a:rPr lang="sl-SI" dirty="0"/>
+              <a:t>Priključitev klienta</a:t>
+            </a:r>
+          </a:p>
+          <a:p>
+            <a:pPr lvl="1"/>
+            <a:r>
+              <a:rPr lang="sl-SI" dirty="0"/>
+              <a:t>Potrjevanje formata</a:t>
+            </a:r>
+          </a:p>
+          <a:p>
+            <a:pPr lvl="1"/>
+            <a:r>
+              <a:rPr lang="sl-SI" dirty="0"/>
+              <a:t>Kontrola zasičenosti</a:t>
+            </a:r>
+          </a:p>
+          <a:p>
+            <a:r>
+              <a:rPr lang="sl-SI" dirty="0"/>
+              <a:t>Pošiljanje klientom</a:t>
+            </a:r>
+          </a:p>
+          <a:p>
+            <a:pPr lvl="1"/>
+            <a:r>
+              <a:rPr lang="sl-SI" dirty="0"/>
+              <a:t>Format</a:t>
+            </a:r>
+          </a:p>
+          <a:p>
+            <a:pPr lvl="1"/>
+            <a:r>
+              <a:rPr lang="sl-SI" dirty="0"/>
+              <a:t>Zvok</a:t>
+            </a:r>
+          </a:p>
+          <a:p>
+            <a:endParaRPr lang="sl-SI" dirty="0"/>
+          </a:p>
+        </p:txBody>
+      </p:sp>
+    </p:spTree>
+    <p:extLst>
+      <p:ext uri="{BB962C8B-B14F-4D97-AF65-F5344CB8AC3E}">
+        <p14:creationId xmlns:p14="http://schemas.microsoft.com/office/powerpoint/2010/main" val="1001801061"/>
+      </p:ext>
+    </p:extLst>
+  </p:cSld>
+  <p:clrMapOvr>
+    <a:masterClrMapping/>
+  </p:clrMapOvr>
+</p:sld>
+</file>
+
+<file path=ppt/slides/slide6.xml><?xml version="1.0" encoding="utf-8"?>
+<p:sld xmlns:a="http://schemas.openxmlformats.org/drawingml/2006/main" xmlns:r="http://schemas.openxmlformats.org/officeDocument/2006/relationships" xmlns:p="http://schemas.openxmlformats.org/presentationml/2006/main">
+  <p:cSld>
+    <p:spTree>
+      <p:nvGrpSpPr>
+        <p:cNvPr id="1" name=""/>
+        <p:cNvGrpSpPr/>
+        <p:nvPr/>
+      </p:nvGrpSpPr>
+      <p:grpSpPr>
+        <a:xfrm>
+          <a:off x="0" y="0"/>
+          <a:ext cx="0" cy="0"/>
+          <a:chOff x="0" y="0"/>
+          <a:chExt cx="0" cy="0"/>
+        </a:xfrm>
+      </p:grpSpPr>
+      <p:sp>
+        <p:nvSpPr>
+          <p:cNvPr id="2" name="Title 1"/>
+          <p:cNvSpPr>
+            <a:spLocks noGrp="1"/>
+          </p:cNvSpPr>
+          <p:nvPr>
+            <p:ph type="title"/>
+          </p:nvPr>
+        </p:nvSpPr>
+        <p:spPr/>
+        <p:txBody>
+          <a:bodyPr/>
+          <a:lstStyle/>
+          <a:p>
+            <a:r>
+              <a:rPr lang="sl-SI" dirty="0" smtClean="0"/>
+              <a:t>Vizualizacija</a:t>
+            </a:r>
+            <a:endParaRPr lang="sl-SI" dirty="0"/>
+          </a:p>
+        </p:txBody>
+      </p:sp>
+      <p:sp>
+        <p:nvSpPr>
+          <p:cNvPr id="3" name="Content Placeholder 2"/>
+          <p:cNvSpPr>
+            <a:spLocks noGrp="1"/>
+          </p:cNvSpPr>
+          <p:nvPr>
+            <p:ph idx="1"/>
+          </p:nvPr>
+        </p:nvSpPr>
+        <p:spPr/>
+        <p:txBody>
+          <a:bodyPr/>
+          <a:lstStyle/>
+          <a:p>
+            <a:endParaRPr lang="sl-SI"/>
+          </a:p>
+        </p:txBody>
+      </p:sp>
+    </p:spTree>
+    <p:extLst>
+      <p:ext uri="{BB962C8B-B14F-4D97-AF65-F5344CB8AC3E}">
+        <p14:creationId xmlns:p14="http://schemas.microsoft.com/office/powerpoint/2010/main" val="1364463319"/>
+      </p:ext>
+    </p:extLst>
+  </p:cSld>
+  <p:clrMapOvr>
+    <a:masterClrMapping/>
+  </p:clrMapOvr>
+</p:sld>
+</file>
+
+<file path=ppt/slides/slide7.xml><?xml version="1.0" encoding="utf-8"?>
+<p:sld xmlns:a="http://schemas.openxmlformats.org/drawingml/2006/main" xmlns:r="http://schemas.openxmlformats.org/officeDocument/2006/relationships" xmlns:p="http://schemas.openxmlformats.org/presentationml/2006/main">
+  <p:cSld>
+    <p:spTree>
+      <p:nvGrpSpPr>
+        <p:cNvPr id="1" name=""/>
+        <p:cNvGrpSpPr/>
+        <p:nvPr/>
+      </p:nvGrpSpPr>
+      <p:grpSpPr>
+        <a:xfrm>
+          <a:off x="0" y="0"/>
+          <a:ext cx="0" cy="0"/>
+          <a:chOff x="0" y="0"/>
+          <a:chExt cx="0" cy="0"/>
+        </a:xfrm>
+      </p:grpSpPr>
+      <p:sp>
+        <p:nvSpPr>
+          <p:cNvPr id="2" name="Title 1"/>
+          <p:cNvSpPr>
+            <a:spLocks noGrp="1"/>
+          </p:cNvSpPr>
+          <p:nvPr>
+            <p:ph type="title"/>
+          </p:nvPr>
+        </p:nvSpPr>
+        <p:spPr/>
+        <p:txBody>
+          <a:bodyPr/>
+          <a:lstStyle/>
+          <a:p>
+            <a:r>
+              <a:rPr lang="sl-SI" dirty="0" smtClean="0"/>
+              <a:t>Zaključek</a:t>
+            </a:r>
+            <a:endParaRPr lang="sl-SI" dirty="0"/>
+          </a:p>
+        </p:txBody>
+      </p:sp>
+      <p:sp>
+        <p:nvSpPr>
+          <p:cNvPr id="3" name="Content Placeholder 2"/>
+          <p:cNvSpPr>
+            <a:spLocks noGrp="1"/>
+          </p:cNvSpPr>
+          <p:nvPr>
+            <p:ph idx="1"/>
+          </p:nvPr>
+        </p:nvSpPr>
+        <p:spPr/>
+        <p:txBody>
+          <a:bodyPr/>
+          <a:lstStyle/>
+          <a:p>
+            <a:r>
+              <a:rPr lang="sl-SI" dirty="0" smtClean="0"/>
+              <a:t>Možnost razširitve tokovnika z glasovanjem (nevem, če se sploh splača tole napisat…)</a:t>
+            </a:r>
+            <a:endParaRPr lang="sl-SI" dirty="0"/>
+          </a:p>
+        </p:txBody>
+      </p:sp>
+    </p:spTree>
+    <p:extLst>
+      <p:ext uri="{BB962C8B-B14F-4D97-AF65-F5344CB8AC3E}">
+        <p14:creationId xmlns:p14="http://schemas.microsoft.com/office/powerpoint/2010/main" val="3831101320"/>
+      </p:ext>
+    </p:extLst>
+  </p:cSld>
+  <p:clrMapOvr>
+    <a:masterClrMapping/>
+  </p:clrMapOvr>
+</p:sld>
 </file>
 
 <file path=ppt/theme/theme1.xml><?xml version="1.0" encoding="utf-8"?>

</xml_diff>